<commit_message>
Adding http-client, Adding http-server
</commit_message>
<xml_diff>
--- a/Proposal-Presentation.pptx
+++ b/Proposal-Presentation.pptx
@@ -6343,7 +6343,7 @@
       </p:sp>
       <p:pic>
         <p:nvPicPr>
-          <p:cNvPr id="4" name="Content Placeholder 3"/>
+          <p:cNvPr id="6" name="Content Placeholder 5"/>
           <p:cNvPicPr>
             <a:picLocks noGrp="1" noChangeAspect="1"/>
           </p:cNvPicPr>
@@ -6352,22 +6352,19 @@
           </p:nvPr>
         </p:nvPicPr>
         <p:blipFill>
-          <a:blip r:embed="rId2">
-            <a:extLst>
-              <a:ext uri="{28A0092B-C50C-407E-A947-70E740481C1C}">
-                <a14:useLocalDpi xmlns:a14="http://schemas.microsoft.com/office/drawing/2010/main" val="0"/>
-              </a:ext>
-            </a:extLst>
-          </a:blip>
+          <a:blip r:embed="rId2"/>
           <a:stretch>
             <a:fillRect/>
           </a:stretch>
         </p:blipFill>
         <p:spPr>
           <a:xfrm>
-            <a:off x="4068147" y="1264950"/>
-            <a:ext cx="5141167" cy="5381017"/>
+            <a:off x="2635134" y="1152982"/>
+            <a:ext cx="6309360" cy="5364195"/>
           </a:xfrm>
+          <a:prstGeom prst="rect">
+            <a:avLst/>
+          </a:prstGeom>
         </p:spPr>
       </p:pic>
     </p:spTree>

</xml_diff>